<commit_message>
Change powerpoint template background to off-white
</commit_message>
<xml_diff>
--- a/dev/covid_report_template.pptx
+++ b/dev/covid_report_template.pptx
@@ -7,6 +7,9 @@
   <p:notesMasterIdLst>
     <p:notesMasterId r:id="rId2"/>
   </p:notesMasterIdLst>
+  <p:handoutMasterIdLst>
+    <p:handoutMasterId r:id="rId3"/>
+  </p:handoutMasterIdLst>
   <p:sldSz cx="12192000" cy="6858000"/>
   <p:notesSz cx="6858000" cy="9144000"/>
   <p:defaultTextStyle>
@@ -153,6 +156,195 @@
 </p:presentation>
 </file>
 
+<file path=ppt/handoutMasters/handoutMaster1.xml><?xml version="1.0" encoding="utf-8"?>
+<p:handoutMaster xmlns:a="http://schemas.openxmlformats.org/drawingml/2006/main" xmlns:r="http://schemas.openxmlformats.org/officeDocument/2006/relationships" xmlns:p="http://schemas.openxmlformats.org/presentationml/2006/main">
+  <p:cSld>
+    <p:bg>
+      <p:bgRef idx="1001">
+        <a:schemeClr val="bg1"/>
+      </p:bgRef>
+    </p:bg>
+    <p:spTree>
+      <p:nvGrpSpPr>
+        <p:cNvPr id="1" name=""/>
+        <p:cNvGrpSpPr/>
+        <p:nvPr/>
+      </p:nvGrpSpPr>
+      <p:grpSpPr>
+        <a:xfrm>
+          <a:off x="0" y="0"/>
+          <a:ext cx="0" cy="0"/>
+          <a:chOff x="0" y="0"/>
+          <a:chExt cx="0" cy="0"/>
+        </a:xfrm>
+      </p:grpSpPr>
+      <p:sp>
+        <p:nvSpPr>
+          <p:cNvPr id="2" name="Header Placeholder 1">
+            <a:extLst>
+              <a:ext uri="{FF2B5EF4-FFF2-40B4-BE49-F238E27FC236}">
+                <a16:creationId xmlns:a16="http://schemas.microsoft.com/office/drawing/2014/main" id="{E9A072F9-DEC6-4D1E-9B93-4FB6D1EC8A75}"/>
+              </a:ext>
+            </a:extLst>
+          </p:cNvPr>
+          <p:cNvSpPr>
+            <a:spLocks noGrp="1"/>
+          </p:cNvSpPr>
+          <p:nvPr>
+            <p:ph type="hdr" sz="quarter"/>
+          </p:nvPr>
+        </p:nvSpPr>
+        <p:spPr>
+          <a:xfrm>
+            <a:off x="0" y="0"/>
+            <a:ext cx="2971800" cy="458788"/>
+          </a:xfrm>
+          <a:prstGeom prst="rect">
+            <a:avLst/>
+          </a:prstGeom>
+        </p:spPr>
+        <p:txBody>
+          <a:bodyPr vert="horz" lIns="91440" tIns="45720" rIns="91440" bIns="45720" rtlCol="0"/>
+          <a:lstStyle>
+            <a:lvl1pPr algn="l">
+              <a:defRPr sz="1200"/>
+            </a:lvl1pPr>
+          </a:lstStyle>
+          <a:p>
+            <a:endParaRPr lang="en-US"/>
+          </a:p>
+        </p:txBody>
+      </p:sp>
+      <p:sp>
+        <p:nvSpPr>
+          <p:cNvPr id="3" name="Date Placeholder 2">
+            <a:extLst>
+              <a:ext uri="{FF2B5EF4-FFF2-40B4-BE49-F238E27FC236}">
+                <a16:creationId xmlns:a16="http://schemas.microsoft.com/office/drawing/2014/main" id="{DE9DB9C8-8100-4BA0-9BBC-4933BD6D6C36}"/>
+              </a:ext>
+            </a:extLst>
+          </p:cNvPr>
+          <p:cNvSpPr>
+            <a:spLocks noGrp="1"/>
+          </p:cNvSpPr>
+          <p:nvPr>
+            <p:ph type="dt" sz="quarter" idx="1"/>
+          </p:nvPr>
+        </p:nvSpPr>
+        <p:spPr>
+          <a:xfrm>
+            <a:off x="3884613" y="0"/>
+            <a:ext cx="2971800" cy="458788"/>
+          </a:xfrm>
+          <a:prstGeom prst="rect">
+            <a:avLst/>
+          </a:prstGeom>
+        </p:spPr>
+        <p:txBody>
+          <a:bodyPr vert="horz" lIns="91440" tIns="45720" rIns="91440" bIns="45720" rtlCol="0"/>
+          <a:lstStyle>
+            <a:lvl1pPr algn="r">
+              <a:defRPr sz="1200"/>
+            </a:lvl1pPr>
+          </a:lstStyle>
+          <a:p>
+            <a:fld id="{12BC3984-E246-47BC-8B53-DDB270F22CB5}" type="datetimeFigureOut">
+              <a:rPr lang="en-US" smtClean="0"/>
+              <a:t>5/13/2021</a:t>
+            </a:fld>
+            <a:endParaRPr lang="en-US"/>
+          </a:p>
+        </p:txBody>
+      </p:sp>
+      <p:sp>
+        <p:nvSpPr>
+          <p:cNvPr id="4" name="Footer Placeholder 3">
+            <a:extLst>
+              <a:ext uri="{FF2B5EF4-FFF2-40B4-BE49-F238E27FC236}">
+                <a16:creationId xmlns:a16="http://schemas.microsoft.com/office/drawing/2014/main" id="{C940E94C-5938-4860-AB81-CF0B9052629C}"/>
+              </a:ext>
+            </a:extLst>
+          </p:cNvPr>
+          <p:cNvSpPr>
+            <a:spLocks noGrp="1"/>
+          </p:cNvSpPr>
+          <p:nvPr>
+            <p:ph type="ftr" sz="quarter" idx="2"/>
+          </p:nvPr>
+        </p:nvSpPr>
+        <p:spPr>
+          <a:xfrm>
+            <a:off x="0" y="8685213"/>
+            <a:ext cx="2971800" cy="458787"/>
+          </a:xfrm>
+          <a:prstGeom prst="rect">
+            <a:avLst/>
+          </a:prstGeom>
+        </p:spPr>
+        <p:txBody>
+          <a:bodyPr vert="horz" lIns="91440" tIns="45720" rIns="91440" bIns="45720" rtlCol="0" anchor="b"/>
+          <a:lstStyle>
+            <a:lvl1pPr algn="l">
+              <a:defRPr sz="1200"/>
+            </a:lvl1pPr>
+          </a:lstStyle>
+          <a:p>
+            <a:endParaRPr lang="en-US"/>
+          </a:p>
+        </p:txBody>
+      </p:sp>
+      <p:sp>
+        <p:nvSpPr>
+          <p:cNvPr id="5" name="Slide Number Placeholder 4">
+            <a:extLst>
+              <a:ext uri="{FF2B5EF4-FFF2-40B4-BE49-F238E27FC236}">
+                <a16:creationId xmlns:a16="http://schemas.microsoft.com/office/drawing/2014/main" id="{CBA8E6DA-A2BE-4BE3-AFCE-1180DFB7F4F4}"/>
+              </a:ext>
+            </a:extLst>
+          </p:cNvPr>
+          <p:cNvSpPr>
+            <a:spLocks noGrp="1"/>
+          </p:cNvSpPr>
+          <p:nvPr>
+            <p:ph type="sldNum" sz="quarter" idx="3"/>
+          </p:nvPr>
+        </p:nvSpPr>
+        <p:spPr>
+          <a:xfrm>
+            <a:off x="3884613" y="8685213"/>
+            <a:ext cx="2971800" cy="458787"/>
+          </a:xfrm>
+          <a:prstGeom prst="rect">
+            <a:avLst/>
+          </a:prstGeom>
+        </p:spPr>
+        <p:txBody>
+          <a:bodyPr vert="horz" lIns="91440" tIns="45720" rIns="91440" bIns="45720" rtlCol="0" anchor="b"/>
+          <a:lstStyle>
+            <a:lvl1pPr algn="r">
+              <a:defRPr sz="1200"/>
+            </a:lvl1pPr>
+          </a:lstStyle>
+          <a:p>
+            <a:fld id="{6781EE1D-6F98-42D8-9367-A276902BC2F8}" type="slidenum">
+              <a:rPr lang="en-US" smtClean="0"/>
+              <a:t>‹#›</a:t>
+            </a:fld>
+            <a:endParaRPr lang="en-US"/>
+          </a:p>
+        </p:txBody>
+      </p:sp>
+    </p:spTree>
+    <p:extLst>
+      <p:ext uri="{BB962C8B-B14F-4D97-AF65-F5344CB8AC3E}">
+        <p14:creationId xmlns:p14="http://schemas.microsoft.com/office/powerpoint/2010/main" val="4007017126"/>
+      </p:ext>
+    </p:extLst>
+  </p:cSld>
+  <p:clrMap bg1="lt1" tx1="dk1" bg2="lt2" tx2="dk2" accent1="accent1" accent2="accent2" accent3="accent3" accent4="accent4" accent5="accent5" accent6="accent6" hlink="hlink" folHlink="folHlink"/>
+</p:handoutMaster>
+</file>
+
 <file path=ppt/notesMasters/notesMaster1.xml><?xml version="1.0" encoding="utf-8"?>
 <p:notesMaster xmlns:a="http://schemas.openxmlformats.org/drawingml/2006/main" xmlns:r="http://schemas.openxmlformats.org/officeDocument/2006/relationships" xmlns:p="http://schemas.openxmlformats.org/presentationml/2006/main">
   <p:cSld>
@@ -2721,9 +2913,12 @@
 <p:sldMaster xmlns:a="http://schemas.openxmlformats.org/drawingml/2006/main" xmlns:r="http://schemas.openxmlformats.org/officeDocument/2006/relationships" xmlns:p="http://schemas.openxmlformats.org/presentationml/2006/main">
   <p:cSld>
     <p:bg>
-      <p:bgRef idx="1001">
-        <a:schemeClr val="bg1"/>
-      </p:bgRef>
+      <p:bgPr>
+        <a:solidFill>
+          <a:srgbClr val="F0F0F0"/>
+        </a:solidFill>
+        <a:effectLst/>
+      </p:bgPr>
     </p:bg>
     <p:spTree>
       <p:nvGrpSpPr>
@@ -3060,7 +3255,18 @@
           <p:nvPr userDrawn="1"/>
         </p:nvPicPr>
         <p:blipFill rotWithShape="1">
-          <a:blip r:embed="rId11" cstate="print"/>
+          <a:blip r:embed="rId11" cstate="print">
+            <a:clrChange>
+              <a:clrFrom>
+                <a:srgbClr val="FFFFFF"/>
+              </a:clrFrom>
+              <a:clrTo>
+                <a:srgbClr val="FFFFFF">
+                  <a:alpha val="0"/>
+                </a:srgbClr>
+              </a:clrTo>
+            </a:clrChange>
+          </a:blip>
           <a:srcRect l="7072" t="9066" r="7070" b="9337"/>
           <a:stretch/>
         </p:blipFill>
@@ -4004,4 +4210,299 @@
     </a:ext>
   </a:extLst>
 </a:theme>
+</file>
+
+<file path=ppt/theme/theme3.xml><?xml version="1.0" encoding="utf-8"?>
+<a:theme xmlns:a="http://schemas.openxmlformats.org/drawingml/2006/main" name="Office Theme">
+  <a:themeElements>
+    <a:clrScheme name="Office">
+      <a:dk1>
+        <a:sysClr val="windowText" lastClr="000000"/>
+      </a:dk1>
+      <a:lt1>
+        <a:sysClr val="window" lastClr="FFFFFF"/>
+      </a:lt1>
+      <a:dk2>
+        <a:srgbClr val="44546A"/>
+      </a:dk2>
+      <a:lt2>
+        <a:srgbClr val="E7E6E6"/>
+      </a:lt2>
+      <a:accent1>
+        <a:srgbClr val="4472C4"/>
+      </a:accent1>
+      <a:accent2>
+        <a:srgbClr val="ED7D31"/>
+      </a:accent2>
+      <a:accent3>
+        <a:srgbClr val="A5A5A5"/>
+      </a:accent3>
+      <a:accent4>
+        <a:srgbClr val="FFC000"/>
+      </a:accent4>
+      <a:accent5>
+        <a:srgbClr val="5B9BD5"/>
+      </a:accent5>
+      <a:accent6>
+        <a:srgbClr val="70AD47"/>
+      </a:accent6>
+      <a:hlink>
+        <a:srgbClr val="0563C1"/>
+      </a:hlink>
+      <a:folHlink>
+        <a:srgbClr val="954F72"/>
+      </a:folHlink>
+    </a:clrScheme>
+    <a:fontScheme name="Office">
+      <a:majorFont>
+        <a:latin typeface="Calibri Light" panose="020F0302020204030204"/>
+        <a:ea typeface=""/>
+        <a:cs typeface=""/>
+        <a:font script="Jpan" typeface="游ゴシック Light"/>
+        <a:font script="Hang" typeface="맑은 고딕"/>
+        <a:font script="Hans" typeface="等线 Light"/>
+        <a:font script="Hant" typeface="新細明體"/>
+        <a:font script="Arab" typeface="Times New Roman"/>
+        <a:font script="Hebr" typeface="Times New Roman"/>
+        <a:font script="Thai" typeface="Angsana New"/>
+        <a:font script="Ethi" typeface="Nyala"/>
+        <a:font script="Beng" typeface="Vrinda"/>
+        <a:font script="Gujr" typeface="Shruti"/>
+        <a:font script="Khmr" typeface="MoolBoran"/>
+        <a:font script="Knda" typeface="Tunga"/>
+        <a:font script="Guru" typeface="Raavi"/>
+        <a:font script="Cans" typeface="Euphemia"/>
+        <a:font script="Cher" typeface="Plantagenet Cherokee"/>
+        <a:font script="Yiii" typeface="Microsoft Yi Baiti"/>
+        <a:font script="Tibt" typeface="Microsoft Himalaya"/>
+        <a:font script="Thaa" typeface="MV Boli"/>
+        <a:font script="Deva" typeface="Mangal"/>
+        <a:font script="Telu" typeface="Gautami"/>
+        <a:font script="Taml" typeface="Latha"/>
+        <a:font script="Syrc" typeface="Estrangelo Edessa"/>
+        <a:font script="Orya" typeface="Kalinga"/>
+        <a:font script="Mlym" typeface="Kartika"/>
+        <a:font script="Laoo" typeface="DokChampa"/>
+        <a:font script="Sinh" typeface="Iskoola Pota"/>
+        <a:font script="Mong" typeface="Mongolian Baiti"/>
+        <a:font script="Viet" typeface="Times New Roman"/>
+        <a:font script="Uigh" typeface="Microsoft Uighur"/>
+        <a:font script="Geor" typeface="Sylfaen"/>
+        <a:font script="Armn" typeface="Arial"/>
+        <a:font script="Bugi" typeface="Leelawadee UI"/>
+        <a:font script="Bopo" typeface="Microsoft JhengHei"/>
+        <a:font script="Java" typeface="Javanese Text"/>
+        <a:font script="Lisu" typeface="Segoe UI"/>
+        <a:font script="Mymr" typeface="Myanmar Text"/>
+        <a:font script="Nkoo" typeface="Ebrima"/>
+        <a:font script="Olck" typeface="Nirmala UI"/>
+        <a:font script="Osma" typeface="Ebrima"/>
+        <a:font script="Phag" typeface="Phagspa"/>
+        <a:font script="Syrn" typeface="Estrangelo Edessa"/>
+        <a:font script="Syrj" typeface="Estrangelo Edessa"/>
+        <a:font script="Syre" typeface="Estrangelo Edessa"/>
+        <a:font script="Sora" typeface="Nirmala UI"/>
+        <a:font script="Tale" typeface="Microsoft Tai Le"/>
+        <a:font script="Talu" typeface="Microsoft New Tai Lue"/>
+        <a:font script="Tfng" typeface="Ebrima"/>
+      </a:majorFont>
+      <a:minorFont>
+        <a:latin typeface="Calibri" panose="020F0502020204030204"/>
+        <a:ea typeface=""/>
+        <a:cs typeface=""/>
+        <a:font script="Jpan" typeface="游ゴシック"/>
+        <a:font script="Hang" typeface="맑은 고딕"/>
+        <a:font script="Hans" typeface="等线"/>
+        <a:font script="Hant" typeface="新細明體"/>
+        <a:font script="Arab" typeface="Arial"/>
+        <a:font script="Hebr" typeface="Arial"/>
+        <a:font script="Thai" typeface="Cordia New"/>
+        <a:font script="Ethi" typeface="Nyala"/>
+        <a:font script="Beng" typeface="Vrinda"/>
+        <a:font script="Gujr" typeface="Shruti"/>
+        <a:font script="Khmr" typeface="DaunPenh"/>
+        <a:font script="Knda" typeface="Tunga"/>
+        <a:font script="Guru" typeface="Raavi"/>
+        <a:font script="Cans" typeface="Euphemia"/>
+        <a:font script="Cher" typeface="Plantagenet Cherokee"/>
+        <a:font script="Yiii" typeface="Microsoft Yi Baiti"/>
+        <a:font script="Tibt" typeface="Microsoft Himalaya"/>
+        <a:font script="Thaa" typeface="MV Boli"/>
+        <a:font script="Deva" typeface="Mangal"/>
+        <a:font script="Telu" typeface="Gautami"/>
+        <a:font script="Taml" typeface="Latha"/>
+        <a:font script="Syrc" typeface="Estrangelo Edessa"/>
+        <a:font script="Orya" typeface="Kalinga"/>
+        <a:font script="Mlym" typeface="Kartika"/>
+        <a:font script="Laoo" typeface="DokChampa"/>
+        <a:font script="Sinh" typeface="Iskoola Pota"/>
+        <a:font script="Mong" typeface="Mongolian Baiti"/>
+        <a:font script="Viet" typeface="Arial"/>
+        <a:font script="Uigh" typeface="Microsoft Uighur"/>
+        <a:font script="Geor" typeface="Sylfaen"/>
+        <a:font script="Armn" typeface="Arial"/>
+        <a:font script="Bugi" typeface="Leelawadee UI"/>
+        <a:font script="Bopo" typeface="Microsoft JhengHei"/>
+        <a:font script="Java" typeface="Javanese Text"/>
+        <a:font script="Lisu" typeface="Segoe UI"/>
+        <a:font script="Mymr" typeface="Myanmar Text"/>
+        <a:font script="Nkoo" typeface="Ebrima"/>
+        <a:font script="Olck" typeface="Nirmala UI"/>
+        <a:font script="Osma" typeface="Ebrima"/>
+        <a:font script="Phag" typeface="Phagspa"/>
+        <a:font script="Syrn" typeface="Estrangelo Edessa"/>
+        <a:font script="Syrj" typeface="Estrangelo Edessa"/>
+        <a:font script="Syre" typeface="Estrangelo Edessa"/>
+        <a:font script="Sora" typeface="Nirmala UI"/>
+        <a:font script="Tale" typeface="Microsoft Tai Le"/>
+        <a:font script="Talu" typeface="Microsoft New Tai Lue"/>
+        <a:font script="Tfng" typeface="Ebrima"/>
+      </a:minorFont>
+    </a:fontScheme>
+    <a:fmtScheme name="Office">
+      <a:fillStyleLst>
+        <a:solidFill>
+          <a:schemeClr val="phClr"/>
+        </a:solidFill>
+        <a:gradFill rotWithShape="1">
+          <a:gsLst>
+            <a:gs pos="0">
+              <a:schemeClr val="phClr">
+                <a:lumMod val="110000"/>
+                <a:satMod val="105000"/>
+                <a:tint val="67000"/>
+              </a:schemeClr>
+            </a:gs>
+            <a:gs pos="50000">
+              <a:schemeClr val="phClr">
+                <a:lumMod val="105000"/>
+                <a:satMod val="103000"/>
+                <a:tint val="73000"/>
+              </a:schemeClr>
+            </a:gs>
+            <a:gs pos="100000">
+              <a:schemeClr val="phClr">
+                <a:lumMod val="105000"/>
+                <a:satMod val="109000"/>
+                <a:tint val="81000"/>
+              </a:schemeClr>
+            </a:gs>
+          </a:gsLst>
+          <a:lin ang="5400000" scaled="0"/>
+        </a:gradFill>
+        <a:gradFill rotWithShape="1">
+          <a:gsLst>
+            <a:gs pos="0">
+              <a:schemeClr val="phClr">
+                <a:satMod val="103000"/>
+                <a:lumMod val="102000"/>
+                <a:tint val="94000"/>
+              </a:schemeClr>
+            </a:gs>
+            <a:gs pos="50000">
+              <a:schemeClr val="phClr">
+                <a:satMod val="110000"/>
+                <a:lumMod val="100000"/>
+                <a:shade val="100000"/>
+              </a:schemeClr>
+            </a:gs>
+            <a:gs pos="100000">
+              <a:schemeClr val="phClr">
+                <a:lumMod val="99000"/>
+                <a:satMod val="120000"/>
+                <a:shade val="78000"/>
+              </a:schemeClr>
+            </a:gs>
+          </a:gsLst>
+          <a:lin ang="5400000" scaled="0"/>
+        </a:gradFill>
+      </a:fillStyleLst>
+      <a:lnStyleLst>
+        <a:ln w="6350" cap="flat" cmpd="sng" algn="ctr">
+          <a:solidFill>
+            <a:schemeClr val="phClr"/>
+          </a:solidFill>
+          <a:prstDash val="solid"/>
+          <a:miter lim="800000"/>
+        </a:ln>
+        <a:ln w="12700" cap="flat" cmpd="sng" algn="ctr">
+          <a:solidFill>
+            <a:schemeClr val="phClr"/>
+          </a:solidFill>
+          <a:prstDash val="solid"/>
+          <a:miter lim="800000"/>
+        </a:ln>
+        <a:ln w="19050" cap="flat" cmpd="sng" algn="ctr">
+          <a:solidFill>
+            <a:schemeClr val="phClr"/>
+          </a:solidFill>
+          <a:prstDash val="solid"/>
+          <a:miter lim="800000"/>
+        </a:ln>
+      </a:lnStyleLst>
+      <a:effectStyleLst>
+        <a:effectStyle>
+          <a:effectLst/>
+        </a:effectStyle>
+        <a:effectStyle>
+          <a:effectLst/>
+        </a:effectStyle>
+        <a:effectStyle>
+          <a:effectLst>
+            <a:outerShdw blurRad="57150" dist="19050" dir="5400000" algn="ctr" rotWithShape="0">
+              <a:srgbClr val="000000">
+                <a:alpha val="63000"/>
+              </a:srgbClr>
+            </a:outerShdw>
+          </a:effectLst>
+        </a:effectStyle>
+      </a:effectStyleLst>
+      <a:bgFillStyleLst>
+        <a:solidFill>
+          <a:schemeClr val="phClr"/>
+        </a:solidFill>
+        <a:solidFill>
+          <a:schemeClr val="phClr">
+            <a:tint val="95000"/>
+            <a:satMod val="170000"/>
+          </a:schemeClr>
+        </a:solidFill>
+        <a:gradFill rotWithShape="1">
+          <a:gsLst>
+            <a:gs pos="0">
+              <a:schemeClr val="phClr">
+                <a:tint val="93000"/>
+                <a:satMod val="150000"/>
+                <a:shade val="98000"/>
+                <a:lumMod val="102000"/>
+              </a:schemeClr>
+            </a:gs>
+            <a:gs pos="50000">
+              <a:schemeClr val="phClr">
+                <a:tint val="98000"/>
+                <a:satMod val="130000"/>
+                <a:shade val="90000"/>
+                <a:lumMod val="103000"/>
+              </a:schemeClr>
+            </a:gs>
+            <a:gs pos="100000">
+              <a:schemeClr val="phClr">
+                <a:shade val="63000"/>
+                <a:satMod val="120000"/>
+              </a:schemeClr>
+            </a:gs>
+          </a:gsLst>
+          <a:lin ang="5400000" scaled="0"/>
+        </a:gradFill>
+      </a:bgFillStyleLst>
+    </a:fmtScheme>
+  </a:themeElements>
+  <a:objectDefaults/>
+  <a:extraClrSchemeLst/>
+  <a:extLst>
+    <a:ext uri="{05A4C25C-085E-4340-85A3-A5531E510DB2}">
+      <thm15:themeFamily xmlns:thm15="http://schemas.microsoft.com/office/thememl/2012/main" name="Office Theme" id="{62F939B6-93AF-4DB8-9C6B-D6C7DFDC589F}" vid="{4A3C46E8-61CC-4603-A589-7422A47A8E4A}"/>
+    </a:ext>
+  </a:extLst>
+</a:theme>
 </file>
</xml_diff>

<commit_message>
Change template size for pics
</commit_message>
<xml_diff>
--- a/dev/covid_report_template.pptx
+++ b/dev/covid_report_template.pptx
@@ -152,6 +152,9 @@
         </p15:guide>
       </p15:sldGuideLst>
     </p:ext>
+    <p:ext uri="{2D200454-40CA-4A62-9FC3-DE9A4176ACB9}">
+      <p15:notesGuideLst xmlns:p15="http://schemas.microsoft.com/office/powerpoint/2012/main"/>
+    </p:ext>
   </p:extLst>
 </p:presentation>
 </file>
@@ -1094,35 +1097,35 @@
         <p:txBody>
           <a:bodyPr/>
           <a:lstStyle>
-            <a:lvl1pPr>
+            <a:lvl1pPr algn="ctr">
               <a:defRPr>
                 <a:effectLst/>
                 <a:latin typeface="Arial" panose="020B0604020202020204" pitchFamily="34" charset="0"/>
                 <a:cs typeface="Arial" panose="020B0604020202020204" pitchFamily="34" charset="0"/>
               </a:defRPr>
             </a:lvl1pPr>
-            <a:lvl2pPr>
+            <a:lvl2pPr algn="ctr">
               <a:defRPr>
                 <a:effectLst/>
                 <a:latin typeface="Arial" panose="020B0604020202020204" pitchFamily="34" charset="0"/>
                 <a:cs typeface="Arial" panose="020B0604020202020204" pitchFamily="34" charset="0"/>
               </a:defRPr>
             </a:lvl2pPr>
-            <a:lvl3pPr>
+            <a:lvl3pPr algn="ctr">
               <a:defRPr>
                 <a:effectLst/>
                 <a:latin typeface="Arial" panose="020B0604020202020204" pitchFamily="34" charset="0"/>
                 <a:cs typeface="Arial" panose="020B0604020202020204" pitchFamily="34" charset="0"/>
               </a:defRPr>
             </a:lvl3pPr>
-            <a:lvl4pPr>
+            <a:lvl4pPr algn="ctr">
               <a:defRPr>
                 <a:effectLst/>
                 <a:latin typeface="Arial" panose="020B0604020202020204" pitchFamily="34" charset="0"/>
                 <a:cs typeface="Arial" panose="020B0604020202020204" pitchFamily="34" charset="0"/>
               </a:defRPr>
             </a:lvl4pPr>
-            <a:lvl5pPr>
+            <a:lvl5pPr algn="ctr">
               <a:defRPr>
                 <a:effectLst/>
                 <a:latin typeface="Arial" panose="020B0604020202020204" pitchFamily="34" charset="0"/>
@@ -1133,38 +1136,37 @@
           <a:p>
             <a:pPr lvl="0"/>
             <a:r>
-              <a:rPr lang="en-US"/>
+              <a:rPr lang="en-US" dirty="0"/>
               <a:t>Edit Master text styles</a:t>
             </a:r>
           </a:p>
           <a:p>
             <a:pPr lvl="1"/>
             <a:r>
-              <a:rPr lang="en-US"/>
+              <a:rPr lang="en-US" dirty="0"/>
               <a:t>Second level</a:t>
             </a:r>
           </a:p>
           <a:p>
             <a:pPr lvl="2"/>
             <a:r>
-              <a:rPr lang="en-US"/>
+              <a:rPr lang="en-US" dirty="0"/>
               <a:t>Third level</a:t>
             </a:r>
           </a:p>
           <a:p>
             <a:pPr lvl="3"/>
             <a:r>
-              <a:rPr lang="en-US"/>
+              <a:rPr lang="en-US" dirty="0"/>
               <a:t>Fourth level</a:t>
             </a:r>
           </a:p>
           <a:p>
             <a:pPr lvl="4"/>
             <a:r>
-              <a:rPr lang="en-US"/>
+              <a:rPr lang="en-US" dirty="0"/>
               <a:t>Fifth level</a:t>
             </a:r>
-            <a:endParaRPr lang="en-US" dirty="0"/>
           </a:p>
         </p:txBody>
       </p:sp>
@@ -2876,8 +2878,8 @@
         </p:nvSpPr>
         <p:spPr>
           <a:xfrm>
-            <a:off x="0" y="0"/>
-            <a:ext cx="12192000" cy="6019800"/>
+            <a:off x="746760" y="0"/>
+            <a:ext cx="10698480" cy="6019800"/>
           </a:xfrm>
         </p:spPr>
         <p:txBody>
@@ -3442,7 +3444,7 @@
       </a:lvl9pPr>
     </p:titleStyle>
     <p:bodyStyle>
-      <a:lvl1pPr marL="342900" indent="-342900" algn="l" rtl="0" eaLnBrk="1" fontAlgn="base" hangingPunct="1">
+      <a:lvl1pPr marL="342900" indent="-342900" algn="just" rtl="0" eaLnBrk="1" fontAlgn="base" hangingPunct="1">
         <a:spcBef>
           <a:spcPct val="20000"/>
         </a:spcBef>
@@ -3460,7 +3462,7 @@
           <a:cs typeface="Arial" panose="020B0604020202020204" pitchFamily="34" charset="0"/>
         </a:defRPr>
       </a:lvl1pPr>
-      <a:lvl2pPr marL="742950" indent="-285750" algn="l" rtl="0" eaLnBrk="1" fontAlgn="base" hangingPunct="1">
+      <a:lvl2pPr marL="742950" indent="-285750" algn="just" rtl="0" eaLnBrk="1" fontAlgn="base" hangingPunct="1">
         <a:spcBef>
           <a:spcPct val="20000"/>
         </a:spcBef>
@@ -3478,7 +3480,7 @@
           <a:cs typeface="Arial" panose="020B0604020202020204" pitchFamily="34" charset="0"/>
         </a:defRPr>
       </a:lvl2pPr>
-      <a:lvl3pPr marL="1143000" indent="-228600" algn="l" rtl="0" eaLnBrk="1" fontAlgn="base" hangingPunct="1">
+      <a:lvl3pPr marL="1143000" indent="-228600" algn="just" rtl="0" eaLnBrk="1" fontAlgn="base" hangingPunct="1">
         <a:spcBef>
           <a:spcPct val="20000"/>
         </a:spcBef>
@@ -3496,7 +3498,7 @@
           <a:cs typeface="Arial" panose="020B0604020202020204" pitchFamily="34" charset="0"/>
         </a:defRPr>
       </a:lvl3pPr>
-      <a:lvl4pPr marL="1600200" indent="-228600" algn="l" rtl="0" eaLnBrk="1" fontAlgn="base" hangingPunct="1">
+      <a:lvl4pPr marL="1600200" indent="-228600" algn="just" rtl="0" eaLnBrk="1" fontAlgn="base" hangingPunct="1">
         <a:spcBef>
           <a:spcPct val="20000"/>
         </a:spcBef>
@@ -3514,7 +3516,7 @@
           <a:cs typeface="Arial" panose="020B0604020202020204" pitchFamily="34" charset="0"/>
         </a:defRPr>
       </a:lvl4pPr>
-      <a:lvl5pPr marL="2057400" indent="-228600" algn="l" rtl="0" eaLnBrk="1" fontAlgn="base" hangingPunct="1">
+      <a:lvl5pPr marL="2057400" indent="-228600" algn="just" rtl="0" eaLnBrk="1" fontAlgn="base" hangingPunct="1">
         <a:spcBef>
           <a:spcPct val="20000"/>
         </a:spcBef>

</xml_diff>